<commit_message>
Feature: Removing component overlap
</commit_message>
<xml_diff>
--- a/s3a/icons/foregroundBackgroundPics.pptx
+++ b/s3a/icons/foregroundBackgroundPics.pptx
@@ -7,6 +7,7 @@
   <p:sldIdLst>
     <p:sldId id="256" r:id="rId2"/>
     <p:sldId id="257" r:id="rId3"/>
+    <p:sldId id="258" r:id="rId4"/>
   </p:sldIdLst>
   <p:sldSz cx="12192000" cy="6858000"/>
   <p:notesSz cx="6858000" cy="9144000"/>
@@ -105,6 +106,11 @@
       </a:defRPr>
     </a:lvl9pPr>
   </p:defaultTextStyle>
+  <p:extLst>
+    <p:ext uri="{EFAFB233-063F-42B5-8137-9DF3F51BA10A}">
+      <p15:sldGuideLst xmlns:p15="http://schemas.microsoft.com/office/powerpoint/2012/main"/>
+    </p:ext>
+  </p:extLst>
 </p:presentation>
 </file>
 
@@ -255,7 +261,7 @@
           <a:p>
             <a:fld id="{05943FB1-1F60-41F6-95EE-1E1F946F5B59}" type="datetimeFigureOut">
               <a:rPr lang="en-US" smtClean="0"/>
-              <a:t>2/22/2020</a:t>
+              <a:t>1/21/2021</a:t>
             </a:fld>
             <a:endParaRPr lang="en-US"/>
           </a:p>
@@ -453,7 +459,7 @@
           <a:p>
             <a:fld id="{05943FB1-1F60-41F6-95EE-1E1F946F5B59}" type="datetimeFigureOut">
               <a:rPr lang="en-US" smtClean="0"/>
-              <a:t>2/22/2020</a:t>
+              <a:t>1/21/2021</a:t>
             </a:fld>
             <a:endParaRPr lang="en-US"/>
           </a:p>
@@ -661,7 +667,7 @@
           <a:p>
             <a:fld id="{05943FB1-1F60-41F6-95EE-1E1F946F5B59}" type="datetimeFigureOut">
               <a:rPr lang="en-US" smtClean="0"/>
-              <a:t>2/22/2020</a:t>
+              <a:t>1/21/2021</a:t>
             </a:fld>
             <a:endParaRPr lang="en-US"/>
           </a:p>
@@ -859,7 +865,7 @@
           <a:p>
             <a:fld id="{05943FB1-1F60-41F6-95EE-1E1F946F5B59}" type="datetimeFigureOut">
               <a:rPr lang="en-US" smtClean="0"/>
-              <a:t>2/22/2020</a:t>
+              <a:t>1/21/2021</a:t>
             </a:fld>
             <a:endParaRPr lang="en-US"/>
           </a:p>
@@ -1134,7 +1140,7 @@
           <a:p>
             <a:fld id="{05943FB1-1F60-41F6-95EE-1E1F946F5B59}" type="datetimeFigureOut">
               <a:rPr lang="en-US" smtClean="0"/>
-              <a:t>2/22/2020</a:t>
+              <a:t>1/21/2021</a:t>
             </a:fld>
             <a:endParaRPr lang="en-US"/>
           </a:p>
@@ -1399,7 +1405,7 @@
           <a:p>
             <a:fld id="{05943FB1-1F60-41F6-95EE-1E1F946F5B59}" type="datetimeFigureOut">
               <a:rPr lang="en-US" smtClean="0"/>
-              <a:t>2/22/2020</a:t>
+              <a:t>1/21/2021</a:t>
             </a:fld>
             <a:endParaRPr lang="en-US"/>
           </a:p>
@@ -1811,7 +1817,7 @@
           <a:p>
             <a:fld id="{05943FB1-1F60-41F6-95EE-1E1F946F5B59}" type="datetimeFigureOut">
               <a:rPr lang="en-US" smtClean="0"/>
-              <a:t>2/22/2020</a:t>
+              <a:t>1/21/2021</a:t>
             </a:fld>
             <a:endParaRPr lang="en-US"/>
           </a:p>
@@ -1952,7 +1958,7 @@
           <a:p>
             <a:fld id="{05943FB1-1F60-41F6-95EE-1E1F946F5B59}" type="datetimeFigureOut">
               <a:rPr lang="en-US" smtClean="0"/>
-              <a:t>2/22/2020</a:t>
+              <a:t>1/21/2021</a:t>
             </a:fld>
             <a:endParaRPr lang="en-US"/>
           </a:p>
@@ -2065,7 +2071,7 @@
           <a:p>
             <a:fld id="{05943FB1-1F60-41F6-95EE-1E1F946F5B59}" type="datetimeFigureOut">
               <a:rPr lang="en-US" smtClean="0"/>
-              <a:t>2/22/2020</a:t>
+              <a:t>1/21/2021</a:t>
             </a:fld>
             <a:endParaRPr lang="en-US"/>
           </a:p>
@@ -2376,7 +2382,7 @@
           <a:p>
             <a:fld id="{05943FB1-1F60-41F6-95EE-1E1F946F5B59}" type="datetimeFigureOut">
               <a:rPr lang="en-US" smtClean="0"/>
-              <a:t>2/22/2020</a:t>
+              <a:t>1/21/2021</a:t>
             </a:fld>
             <a:endParaRPr lang="en-US"/>
           </a:p>
@@ -2664,7 +2670,7 @@
           <a:p>
             <a:fld id="{05943FB1-1F60-41F6-95EE-1E1F946F5B59}" type="datetimeFigureOut">
               <a:rPr lang="en-US" smtClean="0"/>
-              <a:t>2/22/2020</a:t>
+              <a:t>1/21/2021</a:t>
             </a:fld>
             <a:endParaRPr lang="en-US"/>
           </a:p>
@@ -2905,7 +2911,7 @@
           <a:p>
             <a:fld id="{05943FB1-1F60-41F6-95EE-1E1F946F5B59}" type="datetimeFigureOut">
               <a:rPr lang="en-US" smtClean="0"/>
-              <a:t>2/22/2020</a:t>
+              <a:t>1/21/2021</a:t>
             </a:fld>
             <a:endParaRPr lang="en-US"/>
           </a:p>
@@ -4028,6 +4034,389 @@
 </p:sld>
 </file>
 
+<file path=ppt/slides/slide3.xml><?xml version="1.0" encoding="utf-8"?>
+<p:sld xmlns:a="http://schemas.openxmlformats.org/drawingml/2006/main" xmlns:r="http://schemas.openxmlformats.org/officeDocument/2006/relationships" xmlns:p="http://schemas.openxmlformats.org/presentationml/2006/main">
+  <p:cSld>
+    <p:spTree>
+      <p:nvGrpSpPr>
+        <p:cNvPr id="1" name=""/>
+        <p:cNvGrpSpPr/>
+        <p:nvPr/>
+      </p:nvGrpSpPr>
+      <p:grpSpPr>
+        <a:xfrm>
+          <a:off x="0" y="0"/>
+          <a:ext cx="0" cy="0"/>
+          <a:chOff x="0" y="0"/>
+          <a:chExt cx="0" cy="0"/>
+        </a:xfrm>
+      </p:grpSpPr>
+      <p:grpSp>
+        <p:nvGrpSpPr>
+          <p:cNvPr id="32" name="Group 31">
+            <a:extLst>
+              <a:ext uri="{FF2B5EF4-FFF2-40B4-BE49-F238E27FC236}">
+                <a16:creationId xmlns:a16="http://schemas.microsoft.com/office/drawing/2014/main" id="{AD933A86-DF28-4527-B107-4A6532937EC7}"/>
+              </a:ext>
+            </a:extLst>
+          </p:cNvPr>
+          <p:cNvGrpSpPr/>
+          <p:nvPr/>
+        </p:nvGrpSpPr>
+        <p:grpSpPr>
+          <a:xfrm>
+            <a:off x="7424059" y="2397114"/>
+            <a:ext cx="4480564" cy="3840480"/>
+            <a:chOff x="4323808" y="868659"/>
+            <a:chExt cx="4480564" cy="3840480"/>
+          </a:xfrm>
+        </p:grpSpPr>
+        <p:sp>
+          <p:nvSpPr>
+            <p:cNvPr id="23" name="Oval 22">
+              <a:extLst>
+                <a:ext uri="{FF2B5EF4-FFF2-40B4-BE49-F238E27FC236}">
+                  <a16:creationId xmlns:a16="http://schemas.microsoft.com/office/drawing/2014/main" id="{19A5E624-CD33-4C8D-88EE-451DD9E41614}"/>
+                </a:ext>
+              </a:extLst>
+            </p:cNvPr>
+            <p:cNvSpPr/>
+            <p:nvPr/>
+          </p:nvSpPr>
+          <p:spPr>
+            <a:xfrm>
+              <a:off x="4580710" y="868659"/>
+              <a:ext cx="2560320" cy="2560320"/>
+            </a:xfrm>
+            <a:prstGeom prst="ellipse">
+              <a:avLst/>
+            </a:prstGeom>
+            <a:solidFill>
+              <a:schemeClr val="bg2">
+                <a:lumMod val="75000"/>
+              </a:schemeClr>
+            </a:solidFill>
+            <a:ln w="76200">
+              <a:solidFill>
+                <a:schemeClr val="tx1"/>
+              </a:solidFill>
+            </a:ln>
+          </p:spPr>
+          <p:style>
+            <a:lnRef idx="2">
+              <a:schemeClr val="accent1">
+                <a:shade val="50000"/>
+              </a:schemeClr>
+            </a:lnRef>
+            <a:fillRef idx="1">
+              <a:schemeClr val="accent1"/>
+            </a:fillRef>
+            <a:effectRef idx="0">
+              <a:schemeClr val="accent1"/>
+            </a:effectRef>
+            <a:fontRef idx="minor">
+              <a:schemeClr val="lt1"/>
+            </a:fontRef>
+          </p:style>
+          <p:txBody>
+            <a:bodyPr rtlCol="0" anchor="ctr"/>
+            <a:lstStyle/>
+            <a:p>
+              <a:pPr algn="ctr"/>
+              <a:endParaRPr lang="en-US" dirty="0"/>
+            </a:p>
+          </p:txBody>
+        </p:sp>
+        <p:sp>
+          <p:nvSpPr>
+            <p:cNvPr id="30" name="Oval 29">
+              <a:extLst>
+                <a:ext uri="{FF2B5EF4-FFF2-40B4-BE49-F238E27FC236}">
+                  <a16:creationId xmlns:a16="http://schemas.microsoft.com/office/drawing/2014/main" id="{6F279E82-D021-47A1-B212-5D1D58352B3E}"/>
+                </a:ext>
+              </a:extLst>
+            </p:cNvPr>
+            <p:cNvSpPr/>
+            <p:nvPr/>
+          </p:nvSpPr>
+          <p:spPr>
+            <a:xfrm>
+              <a:off x="6244052" y="1519827"/>
+              <a:ext cx="2560320" cy="2560320"/>
+            </a:xfrm>
+            <a:prstGeom prst="ellipse">
+              <a:avLst/>
+            </a:prstGeom>
+            <a:solidFill>
+              <a:schemeClr val="tx1">
+                <a:lumMod val="95000"/>
+                <a:lumOff val="5000"/>
+              </a:schemeClr>
+            </a:solidFill>
+            <a:ln w="76200">
+              <a:solidFill>
+                <a:schemeClr val="tx1"/>
+              </a:solidFill>
+            </a:ln>
+          </p:spPr>
+          <p:style>
+            <a:lnRef idx="2">
+              <a:schemeClr val="accent1">
+                <a:shade val="50000"/>
+              </a:schemeClr>
+            </a:lnRef>
+            <a:fillRef idx="1">
+              <a:schemeClr val="accent1"/>
+            </a:fillRef>
+            <a:effectRef idx="0">
+              <a:schemeClr val="accent1"/>
+            </a:effectRef>
+            <a:fontRef idx="minor">
+              <a:schemeClr val="lt1"/>
+            </a:fontRef>
+          </p:style>
+          <p:txBody>
+            <a:bodyPr rtlCol="0" anchor="ctr"/>
+            <a:lstStyle/>
+            <a:p>
+              <a:pPr algn="ctr"/>
+              <a:endParaRPr lang="en-US" dirty="0"/>
+            </a:p>
+          </p:txBody>
+        </p:sp>
+        <p:sp>
+          <p:nvSpPr>
+            <p:cNvPr id="31" name="Oval 30">
+              <a:extLst>
+                <a:ext uri="{FF2B5EF4-FFF2-40B4-BE49-F238E27FC236}">
+                  <a16:creationId xmlns:a16="http://schemas.microsoft.com/office/drawing/2014/main" id="{9114FFF9-A7E3-44DC-B80F-177ED7388E06}"/>
+                </a:ext>
+              </a:extLst>
+            </p:cNvPr>
+            <p:cNvSpPr/>
+            <p:nvPr/>
+          </p:nvSpPr>
+          <p:spPr>
+            <a:xfrm>
+              <a:off x="4323808" y="2148819"/>
+              <a:ext cx="2560320" cy="2560320"/>
+            </a:xfrm>
+            <a:prstGeom prst="ellipse">
+              <a:avLst/>
+            </a:prstGeom>
+            <a:solidFill>
+              <a:schemeClr val="bg1"/>
+            </a:solidFill>
+            <a:ln w="76200">
+              <a:solidFill>
+                <a:schemeClr val="tx1"/>
+              </a:solidFill>
+            </a:ln>
+          </p:spPr>
+          <p:style>
+            <a:lnRef idx="2">
+              <a:schemeClr val="accent1">
+                <a:shade val="50000"/>
+              </a:schemeClr>
+            </a:lnRef>
+            <a:fillRef idx="1">
+              <a:schemeClr val="accent1"/>
+            </a:fillRef>
+            <a:effectRef idx="0">
+              <a:schemeClr val="accent1"/>
+            </a:effectRef>
+            <a:fontRef idx="minor">
+              <a:schemeClr val="lt1"/>
+            </a:fontRef>
+          </p:style>
+          <p:txBody>
+            <a:bodyPr rtlCol="0" anchor="ctr"/>
+            <a:lstStyle/>
+            <a:p>
+              <a:pPr algn="ctr"/>
+              <a:endParaRPr lang="en-US" dirty="0"/>
+            </a:p>
+          </p:txBody>
+        </p:sp>
+      </p:grpSp>
+      <p:sp>
+        <p:nvSpPr>
+          <p:cNvPr id="22" name="Freeform: Shape 21">
+            <a:extLst>
+              <a:ext uri="{FF2B5EF4-FFF2-40B4-BE49-F238E27FC236}">
+                <a16:creationId xmlns:a16="http://schemas.microsoft.com/office/drawing/2014/main" id="{EA5E3D01-6C85-4461-8F12-D21B5E4036B7}"/>
+              </a:ext>
+            </a:extLst>
+          </p:cNvPr>
+          <p:cNvSpPr/>
+          <p:nvPr/>
+        </p:nvSpPr>
+        <p:spPr>
+          <a:xfrm>
+            <a:off x="1070068" y="736258"/>
+            <a:ext cx="1562096" cy="2063729"/>
+          </a:xfrm>
+          <a:custGeom>
+            <a:avLst/>
+            <a:gdLst>
+              <a:gd name="connsiteX0" fmla="*/ 0 w 1562096"/>
+              <a:gd name="connsiteY0" fmla="*/ 0 h 2063729"/>
+              <a:gd name="connsiteX1" fmla="*/ 1562096 w 1562096"/>
+              <a:gd name="connsiteY1" fmla="*/ 0 h 2063729"/>
+              <a:gd name="connsiteX2" fmla="*/ 1562096 w 1562096"/>
+              <a:gd name="connsiteY2" fmla="*/ 506316 h 2063729"/>
+              <a:gd name="connsiteX3" fmla="*/ 486106 w 1562096"/>
+              <a:gd name="connsiteY3" fmla="*/ 506316 h 2063729"/>
+              <a:gd name="connsiteX4" fmla="*/ 486106 w 1562096"/>
+              <a:gd name="connsiteY4" fmla="*/ 2063729 h 2063729"/>
+              <a:gd name="connsiteX5" fmla="*/ 0 w 1562096"/>
+              <a:gd name="connsiteY5" fmla="*/ 2063729 h 2063729"/>
+            </a:gdLst>
+            <a:ahLst/>
+            <a:cxnLst>
+              <a:cxn ang="0">
+                <a:pos x="connsiteX0" y="connsiteY0"/>
+              </a:cxn>
+              <a:cxn ang="0">
+                <a:pos x="connsiteX1" y="connsiteY1"/>
+              </a:cxn>
+              <a:cxn ang="0">
+                <a:pos x="connsiteX2" y="connsiteY2"/>
+              </a:cxn>
+              <a:cxn ang="0">
+                <a:pos x="connsiteX3" y="connsiteY3"/>
+              </a:cxn>
+              <a:cxn ang="0">
+                <a:pos x="connsiteX4" y="connsiteY4"/>
+              </a:cxn>
+              <a:cxn ang="0">
+                <a:pos x="connsiteX5" y="connsiteY5"/>
+              </a:cxn>
+            </a:cxnLst>
+            <a:rect l="l" t="t" r="r" b="b"/>
+            <a:pathLst>
+              <a:path w="1562096" h="2063729">
+                <a:moveTo>
+                  <a:pt x="0" y="0"/>
+                </a:moveTo>
+                <a:lnTo>
+                  <a:pt x="1562096" y="0"/>
+                </a:lnTo>
+                <a:lnTo>
+                  <a:pt x="1562096" y="506316"/>
+                </a:lnTo>
+                <a:lnTo>
+                  <a:pt x="486106" y="506316"/>
+                </a:lnTo>
+                <a:lnTo>
+                  <a:pt x="486106" y="2063729"/>
+                </a:lnTo>
+                <a:lnTo>
+                  <a:pt x="0" y="2063729"/>
+                </a:lnTo>
+                <a:close/>
+              </a:path>
+            </a:pathLst>
+          </a:custGeom>
+          <a:noFill/>
+          <a:ln w="209550">
+            <a:solidFill>
+              <a:schemeClr val="tx1"/>
+            </a:solidFill>
+          </a:ln>
+        </p:spPr>
+        <p:style>
+          <a:lnRef idx="2">
+            <a:schemeClr val="accent1">
+              <a:shade val="50000"/>
+            </a:schemeClr>
+          </a:lnRef>
+          <a:fillRef idx="1">
+            <a:schemeClr val="accent1"/>
+          </a:fillRef>
+          <a:effectRef idx="0">
+            <a:schemeClr val="accent1"/>
+          </a:effectRef>
+          <a:fontRef idx="minor">
+            <a:schemeClr val="lt1"/>
+          </a:fontRef>
+        </p:style>
+        <p:txBody>
+          <a:bodyPr wrap="square" rtlCol="0" anchor="ctr">
+            <a:noAutofit/>
+          </a:bodyPr>
+          <a:lstStyle/>
+          <a:p>
+            <a:pPr algn="ctr"/>
+            <a:endParaRPr lang="en-US"/>
+          </a:p>
+        </p:txBody>
+      </p:sp>
+      <p:sp>
+        <p:nvSpPr>
+          <p:cNvPr id="24" name="Rectangle 23">
+            <a:extLst>
+              <a:ext uri="{FF2B5EF4-FFF2-40B4-BE49-F238E27FC236}">
+                <a16:creationId xmlns:a16="http://schemas.microsoft.com/office/drawing/2014/main" id="{03EB5A8F-28E6-485E-AFEA-D3B0A7A59A2F}"/>
+              </a:ext>
+            </a:extLst>
+          </p:cNvPr>
+          <p:cNvSpPr/>
+          <p:nvPr/>
+        </p:nvSpPr>
+        <p:spPr>
+          <a:xfrm>
+            <a:off x="1567543" y="1252190"/>
+            <a:ext cx="1562096" cy="2063729"/>
+          </a:xfrm>
+          <a:prstGeom prst="rect">
+            <a:avLst/>
+          </a:prstGeom>
+          <a:noFill/>
+          <a:ln w="209550">
+            <a:solidFill>
+              <a:schemeClr val="tx1"/>
+            </a:solidFill>
+          </a:ln>
+        </p:spPr>
+        <p:style>
+          <a:lnRef idx="2">
+            <a:schemeClr val="accent1">
+              <a:shade val="50000"/>
+            </a:schemeClr>
+          </a:lnRef>
+          <a:fillRef idx="1">
+            <a:schemeClr val="accent1"/>
+          </a:fillRef>
+          <a:effectRef idx="0">
+            <a:schemeClr val="accent1"/>
+          </a:effectRef>
+          <a:fontRef idx="minor">
+            <a:schemeClr val="lt1"/>
+          </a:fontRef>
+        </p:style>
+        <p:txBody>
+          <a:bodyPr rtlCol="0" anchor="ctr"/>
+          <a:lstStyle/>
+          <a:p>
+            <a:pPr algn="ctr"/>
+            <a:endParaRPr lang="en-US"/>
+          </a:p>
+        </p:txBody>
+      </p:sp>
+    </p:spTree>
+    <p:extLst>
+      <p:ext uri="{BB962C8B-B14F-4D97-AF65-F5344CB8AC3E}">
+        <p14:creationId xmlns:p14="http://schemas.microsoft.com/office/powerpoint/2010/main" val="3347993527"/>
+      </p:ext>
+    </p:extLst>
+  </p:cSld>
+  <p:clrMapOvr>
+    <a:masterClrMapping/>
+  </p:clrMapOvr>
+</p:sld>
+</file>
+
 <file path=ppt/theme/theme1.xml><?xml version="1.0" encoding="utf-8"?>
 <a:theme xmlns:a="http://schemas.openxmlformats.org/drawingml/2006/main" name="Office Theme">
   <a:themeElements>

</xml_diff>